<commit_message>
added basic wireframes to pptx
</commit_message>
<xml_diff>
--- a/Files/Synoptic project 2023.pptx
+++ b/Files/Synoptic project 2023.pptx
@@ -12,6 +12,7 @@
     <p:sldId id="258" r:id="rId6"/>
     <p:sldId id="259" r:id="rId7"/>
     <p:sldId id="260" r:id="rId8"/>
+    <p:sldId id="263" r:id="rId9"/>
   </p:sldIdLst>
   <p:sldSz cx="12192000" cy="6858000"/>
   <p:notesSz cx="6858000" cy="9144000"/>
@@ -110,6 +111,11 @@
       </a:defRPr>
     </a:lvl9pPr>
   </p:defaultTextStyle>
+  <p:extLst>
+    <p:ext uri="{EFAFB233-063F-42B5-8137-9DF3F51BA10A}">
+      <p15:sldGuideLst xmlns:p15="http://schemas.microsoft.com/office/powerpoint/2012/main"/>
+    </p:ext>
+  </p:extLst>
 </p:presentation>
 </file>
 
@@ -262,7 +268,7 @@
           <a:p>
             <a:fld id="{4F434B10-FAB1-4BEF-A575-45F3C0A8F2CA}" type="datetimeFigureOut">
               <a:rPr lang="en-GB" smtClean="0"/>
-              <a:t>10/06/2023</a:t>
+              <a:t>12/06/2023</a:t>
             </a:fld>
             <a:endParaRPr lang="en-GB"/>
           </a:p>
@@ -462,7 +468,7 @@
           <a:p>
             <a:fld id="{4F434B10-FAB1-4BEF-A575-45F3C0A8F2CA}" type="datetimeFigureOut">
               <a:rPr lang="en-GB" smtClean="0"/>
-              <a:t>10/06/2023</a:t>
+              <a:t>12/06/2023</a:t>
             </a:fld>
             <a:endParaRPr lang="en-GB"/>
           </a:p>
@@ -672,7 +678,7 @@
           <a:p>
             <a:fld id="{4F434B10-FAB1-4BEF-A575-45F3C0A8F2CA}" type="datetimeFigureOut">
               <a:rPr lang="en-GB" smtClean="0"/>
-              <a:t>10/06/2023</a:t>
+              <a:t>12/06/2023</a:t>
             </a:fld>
             <a:endParaRPr lang="en-GB"/>
           </a:p>
@@ -872,7 +878,7 @@
           <a:p>
             <a:fld id="{4F434B10-FAB1-4BEF-A575-45F3C0A8F2CA}" type="datetimeFigureOut">
               <a:rPr lang="en-GB" smtClean="0"/>
-              <a:t>10/06/2023</a:t>
+              <a:t>12/06/2023</a:t>
             </a:fld>
             <a:endParaRPr lang="en-GB"/>
           </a:p>
@@ -1148,7 +1154,7 @@
           <a:p>
             <a:fld id="{4F434B10-FAB1-4BEF-A575-45F3C0A8F2CA}" type="datetimeFigureOut">
               <a:rPr lang="en-GB" smtClean="0"/>
-              <a:t>10/06/2023</a:t>
+              <a:t>12/06/2023</a:t>
             </a:fld>
             <a:endParaRPr lang="en-GB"/>
           </a:p>
@@ -1416,7 +1422,7 @@
           <a:p>
             <a:fld id="{4F434B10-FAB1-4BEF-A575-45F3C0A8F2CA}" type="datetimeFigureOut">
               <a:rPr lang="en-GB" smtClean="0"/>
-              <a:t>10/06/2023</a:t>
+              <a:t>12/06/2023</a:t>
             </a:fld>
             <a:endParaRPr lang="en-GB"/>
           </a:p>
@@ -1831,7 +1837,7 @@
           <a:p>
             <a:fld id="{4F434B10-FAB1-4BEF-A575-45F3C0A8F2CA}" type="datetimeFigureOut">
               <a:rPr lang="en-GB" smtClean="0"/>
-              <a:t>10/06/2023</a:t>
+              <a:t>12/06/2023</a:t>
             </a:fld>
             <a:endParaRPr lang="en-GB"/>
           </a:p>
@@ -1973,7 +1979,7 @@
           <a:p>
             <a:fld id="{4F434B10-FAB1-4BEF-A575-45F3C0A8F2CA}" type="datetimeFigureOut">
               <a:rPr lang="en-GB" smtClean="0"/>
-              <a:t>10/06/2023</a:t>
+              <a:t>12/06/2023</a:t>
             </a:fld>
             <a:endParaRPr lang="en-GB"/>
           </a:p>
@@ -2086,7 +2092,7 @@
           <a:p>
             <a:fld id="{4F434B10-FAB1-4BEF-A575-45F3C0A8F2CA}" type="datetimeFigureOut">
               <a:rPr lang="en-GB" smtClean="0"/>
-              <a:t>10/06/2023</a:t>
+              <a:t>12/06/2023</a:t>
             </a:fld>
             <a:endParaRPr lang="en-GB"/>
           </a:p>
@@ -2399,7 +2405,7 @@
           <a:p>
             <a:fld id="{4F434B10-FAB1-4BEF-A575-45F3C0A8F2CA}" type="datetimeFigureOut">
               <a:rPr lang="en-GB" smtClean="0"/>
-              <a:t>10/06/2023</a:t>
+              <a:t>12/06/2023</a:t>
             </a:fld>
             <a:endParaRPr lang="en-GB"/>
           </a:p>
@@ -2688,7 +2694,7 @@
           <a:p>
             <a:fld id="{4F434B10-FAB1-4BEF-A575-45F3C0A8F2CA}" type="datetimeFigureOut">
               <a:rPr lang="en-GB" smtClean="0"/>
-              <a:t>10/06/2023</a:t>
+              <a:t>12/06/2023</a:t>
             </a:fld>
             <a:endParaRPr lang="en-GB"/>
           </a:p>
@@ -2931,7 +2937,7 @@
           <a:p>
             <a:fld id="{4F434B10-FAB1-4BEF-A575-45F3C0A8F2CA}" type="datetimeFigureOut">
               <a:rPr lang="en-GB" smtClean="0"/>
-              <a:t>10/06/2023</a:t>
+              <a:t>12/06/2023</a:t>
             </a:fld>
             <a:endParaRPr lang="en-GB"/>
           </a:p>
@@ -4379,6 +4385,134 @@
 </p:sld>
 </file>
 
+<file path=ppt/slides/slide8.xml><?xml version="1.0" encoding="utf-8"?>
+<p:sld xmlns:a="http://schemas.openxmlformats.org/drawingml/2006/main" xmlns:r="http://schemas.openxmlformats.org/officeDocument/2006/relationships" xmlns:p="http://schemas.openxmlformats.org/presentationml/2006/main">
+  <p:cSld>
+    <p:spTree>
+      <p:nvGrpSpPr>
+        <p:cNvPr id="1" name=""/>
+        <p:cNvGrpSpPr/>
+        <p:nvPr/>
+      </p:nvGrpSpPr>
+      <p:grpSpPr>
+        <a:xfrm>
+          <a:off x="0" y="0"/>
+          <a:ext cx="0" cy="0"/>
+          <a:chOff x="0" y="0"/>
+          <a:chExt cx="0" cy="0"/>
+        </a:xfrm>
+      </p:grpSpPr>
+      <p:sp>
+        <p:nvSpPr>
+          <p:cNvPr id="2" name="Title 1">
+            <a:extLst>
+              <a:ext uri="{FF2B5EF4-FFF2-40B4-BE49-F238E27FC236}">
+                <a16:creationId xmlns:a16="http://schemas.microsoft.com/office/drawing/2014/main" id="{F1E9AB5F-A584-AF38-532A-56E890561A02}"/>
+              </a:ext>
+            </a:extLst>
+          </p:cNvPr>
+          <p:cNvSpPr>
+            <a:spLocks noGrp="1"/>
+          </p:cNvSpPr>
+          <p:nvPr>
+            <p:ph type="title"/>
+          </p:nvPr>
+        </p:nvSpPr>
+        <p:spPr/>
+        <p:txBody>
+          <a:bodyPr/>
+          <a:lstStyle/>
+          <a:p>
+            <a:r>
+              <a:rPr lang="en-GB" dirty="0"/>
+              <a:t>wireframes</a:t>
+            </a:r>
+          </a:p>
+        </p:txBody>
+      </p:sp>
+      <p:pic>
+        <p:nvPicPr>
+          <p:cNvPr id="6" name="Content Placeholder 5" descr="A screenshot of a search box&#10;&#10;Description automatically generated with low confidence">
+            <a:extLst>
+              <a:ext uri="{FF2B5EF4-FFF2-40B4-BE49-F238E27FC236}">
+                <a16:creationId xmlns:a16="http://schemas.microsoft.com/office/drawing/2014/main" id="{AC2A1E7F-C079-EA2D-7A4B-CA26ACAC7217}"/>
+              </a:ext>
+            </a:extLst>
+          </p:cNvPr>
+          <p:cNvPicPr>
+            <a:picLocks noGrp="1" noChangeAspect="1"/>
+          </p:cNvPicPr>
+          <p:nvPr>
+            <p:ph sz="half" idx="1"/>
+          </p:nvPr>
+        </p:nvPicPr>
+        <p:blipFill>
+          <a:blip r:embed="rId2">
+            <a:extLst>
+              <a:ext uri="{28A0092B-C50C-407E-A947-70E740481C1C}">
+                <a14:useLocalDpi xmlns:a14="http://schemas.microsoft.com/office/drawing/2010/main" val="0"/>
+              </a:ext>
+            </a:extLst>
+          </a:blip>
+          <a:stretch>
+            <a:fillRect/>
+          </a:stretch>
+        </p:blipFill>
+        <p:spPr>
+          <a:xfrm>
+            <a:off x="838200" y="2087663"/>
+            <a:ext cx="5181600" cy="3827261"/>
+          </a:xfrm>
+        </p:spPr>
+      </p:pic>
+      <p:pic>
+        <p:nvPicPr>
+          <p:cNvPr id="12" name="Content Placeholder 11" descr="A screenshot of a computer&#10;&#10;Description automatically generated with medium confidence">
+            <a:extLst>
+              <a:ext uri="{FF2B5EF4-FFF2-40B4-BE49-F238E27FC236}">
+                <a16:creationId xmlns:a16="http://schemas.microsoft.com/office/drawing/2014/main" id="{5D38BAE2-B258-12E4-BAAC-5C2BAD59D1F0}"/>
+              </a:ext>
+            </a:extLst>
+          </p:cNvPr>
+          <p:cNvPicPr>
+            <a:picLocks noGrp="1" noChangeAspect="1"/>
+          </p:cNvPicPr>
+          <p:nvPr>
+            <p:ph sz="half" idx="2"/>
+          </p:nvPr>
+        </p:nvPicPr>
+        <p:blipFill>
+          <a:blip r:embed="rId3">
+            <a:extLst>
+              <a:ext uri="{28A0092B-C50C-407E-A947-70E740481C1C}">
+                <a14:useLocalDpi xmlns:a14="http://schemas.microsoft.com/office/drawing/2010/main" val="0"/>
+              </a:ext>
+            </a:extLst>
+          </a:blip>
+          <a:stretch>
+            <a:fillRect/>
+          </a:stretch>
+        </p:blipFill>
+        <p:spPr>
+          <a:xfrm>
+            <a:off x="6172200" y="2066457"/>
+            <a:ext cx="5181600" cy="3869673"/>
+          </a:xfrm>
+        </p:spPr>
+      </p:pic>
+    </p:spTree>
+    <p:extLst>
+      <p:ext uri="{BB962C8B-B14F-4D97-AF65-F5344CB8AC3E}">
+        <p14:creationId xmlns:p14="http://schemas.microsoft.com/office/powerpoint/2010/main" val="3771815473"/>
+      </p:ext>
+    </p:extLst>
+  </p:cSld>
+  <p:clrMapOvr>
+    <a:masterClrMapping/>
+  </p:clrMapOvr>
+</p:sld>
+</file>
+
 <file path=ppt/theme/theme1.xml><?xml version="1.0" encoding="utf-8"?>
 <a:theme xmlns:a="http://schemas.openxmlformats.org/drawingml/2006/main" name="Office Theme">
   <a:themeElements>

</xml_diff>

<commit_message>
Added use case diagram
</commit_message>
<xml_diff>
--- a/Files/Synoptic project 2023.pptx
+++ b/Files/Synoptic project 2023.pptx
@@ -13,6 +13,7 @@
     <p:sldId id="259" r:id="rId7"/>
     <p:sldId id="260" r:id="rId8"/>
     <p:sldId id="263" r:id="rId9"/>
+    <p:sldId id="264" r:id="rId10"/>
   </p:sldIdLst>
   <p:sldSz cx="12192000" cy="6858000"/>
   <p:notesSz cx="6858000" cy="9144000"/>
@@ -4513,6 +4514,99 @@
 </p:sld>
 </file>
 
+<file path=ppt/slides/slide9.xml><?xml version="1.0" encoding="utf-8"?>
+<p:sld xmlns:a="http://schemas.openxmlformats.org/drawingml/2006/main" xmlns:r="http://schemas.openxmlformats.org/officeDocument/2006/relationships" xmlns:p="http://schemas.openxmlformats.org/presentationml/2006/main">
+  <p:cSld>
+    <p:spTree>
+      <p:nvGrpSpPr>
+        <p:cNvPr id="1" name=""/>
+        <p:cNvGrpSpPr/>
+        <p:nvPr/>
+      </p:nvGrpSpPr>
+      <p:grpSpPr>
+        <a:xfrm>
+          <a:off x="0" y="0"/>
+          <a:ext cx="0" cy="0"/>
+          <a:chOff x="0" y="0"/>
+          <a:chExt cx="0" cy="0"/>
+        </a:xfrm>
+      </p:grpSpPr>
+      <p:sp>
+        <p:nvSpPr>
+          <p:cNvPr id="2" name="Title 1">
+            <a:extLst>
+              <a:ext uri="{FF2B5EF4-FFF2-40B4-BE49-F238E27FC236}">
+                <a16:creationId xmlns:a16="http://schemas.microsoft.com/office/drawing/2014/main" id="{9CD91D97-1A29-C375-BE76-83DE0B3EEAEF}"/>
+              </a:ext>
+            </a:extLst>
+          </p:cNvPr>
+          <p:cNvSpPr>
+            <a:spLocks noGrp="1"/>
+          </p:cNvSpPr>
+          <p:nvPr>
+            <p:ph type="title"/>
+          </p:nvPr>
+        </p:nvSpPr>
+        <p:spPr/>
+        <p:txBody>
+          <a:bodyPr/>
+          <a:lstStyle/>
+          <a:p>
+            <a:r>
+              <a:rPr lang="en-GB" dirty="0"/>
+              <a:t>Use Case Diagram</a:t>
+            </a:r>
+          </a:p>
+        </p:txBody>
+      </p:sp>
+      <p:pic>
+        <p:nvPicPr>
+          <p:cNvPr id="5" name="Content Placeholder 4" descr="A diagram of a product&#10;&#10;Description automatically generated with low confidence">
+            <a:extLst>
+              <a:ext uri="{FF2B5EF4-FFF2-40B4-BE49-F238E27FC236}">
+                <a16:creationId xmlns:a16="http://schemas.microsoft.com/office/drawing/2014/main" id="{744E3040-6087-9B57-CC90-1C9A74B2C9A5}"/>
+              </a:ext>
+            </a:extLst>
+          </p:cNvPr>
+          <p:cNvPicPr>
+            <a:picLocks noGrp="1" noChangeAspect="1"/>
+          </p:cNvPicPr>
+          <p:nvPr>
+            <p:ph idx="1"/>
+          </p:nvPr>
+        </p:nvPicPr>
+        <p:blipFill>
+          <a:blip r:embed="rId2">
+            <a:extLst>
+              <a:ext uri="{28A0092B-C50C-407E-A947-70E740481C1C}">
+                <a14:useLocalDpi xmlns:a14="http://schemas.microsoft.com/office/drawing/2010/main" val="0"/>
+              </a:ext>
+            </a:extLst>
+          </a:blip>
+          <a:stretch>
+            <a:fillRect/>
+          </a:stretch>
+        </p:blipFill>
+        <p:spPr>
+          <a:xfrm>
+            <a:off x="2909054" y="1825625"/>
+            <a:ext cx="6373891" cy="4351338"/>
+          </a:xfrm>
+        </p:spPr>
+      </p:pic>
+    </p:spTree>
+    <p:extLst>
+      <p:ext uri="{BB962C8B-B14F-4D97-AF65-F5344CB8AC3E}">
+        <p14:creationId xmlns:p14="http://schemas.microsoft.com/office/powerpoint/2010/main" val="1069822731"/>
+      </p:ext>
+    </p:extLst>
+  </p:cSld>
+  <p:clrMapOvr>
+    <a:masterClrMapping/>
+  </p:clrMapOvr>
+</p:sld>
+</file>
+
 <file path=ppt/theme/theme1.xml><?xml version="1.0" encoding="utf-8"?>
 <a:theme xmlns:a="http://schemas.openxmlformats.org/drawingml/2006/main" name="Office Theme">
   <a:themeElements>

</xml_diff>

<commit_message>
added a class diagram
</commit_message>
<xml_diff>
--- a/Files/Synoptic project 2023.pptx
+++ b/Files/Synoptic project 2023.pptx
@@ -12,8 +12,9 @@
     <p:sldId id="258" r:id="rId6"/>
     <p:sldId id="259" r:id="rId7"/>
     <p:sldId id="260" r:id="rId8"/>
-    <p:sldId id="263" r:id="rId9"/>
+    <p:sldId id="265" r:id="rId9"/>
     <p:sldId id="264" r:id="rId10"/>
+    <p:sldId id="263" r:id="rId11"/>
   </p:sldIdLst>
   <p:sldSz cx="12192000" cy="6858000"/>
   <p:notesSz cx="6858000" cy="9144000"/>
@@ -269,7 +270,7 @@
           <a:p>
             <a:fld id="{4F434B10-FAB1-4BEF-A575-45F3C0A8F2CA}" type="datetimeFigureOut">
               <a:rPr lang="en-GB" smtClean="0"/>
-              <a:t>12/06/2023</a:t>
+              <a:t>14/06/2023</a:t>
             </a:fld>
             <a:endParaRPr lang="en-GB"/>
           </a:p>
@@ -469,7 +470,7 @@
           <a:p>
             <a:fld id="{4F434B10-FAB1-4BEF-A575-45F3C0A8F2CA}" type="datetimeFigureOut">
               <a:rPr lang="en-GB" smtClean="0"/>
-              <a:t>12/06/2023</a:t>
+              <a:t>14/06/2023</a:t>
             </a:fld>
             <a:endParaRPr lang="en-GB"/>
           </a:p>
@@ -679,7 +680,7 @@
           <a:p>
             <a:fld id="{4F434B10-FAB1-4BEF-A575-45F3C0A8F2CA}" type="datetimeFigureOut">
               <a:rPr lang="en-GB" smtClean="0"/>
-              <a:t>12/06/2023</a:t>
+              <a:t>14/06/2023</a:t>
             </a:fld>
             <a:endParaRPr lang="en-GB"/>
           </a:p>
@@ -879,7 +880,7 @@
           <a:p>
             <a:fld id="{4F434B10-FAB1-4BEF-A575-45F3C0A8F2CA}" type="datetimeFigureOut">
               <a:rPr lang="en-GB" smtClean="0"/>
-              <a:t>12/06/2023</a:t>
+              <a:t>14/06/2023</a:t>
             </a:fld>
             <a:endParaRPr lang="en-GB"/>
           </a:p>
@@ -1155,7 +1156,7 @@
           <a:p>
             <a:fld id="{4F434B10-FAB1-4BEF-A575-45F3C0A8F2CA}" type="datetimeFigureOut">
               <a:rPr lang="en-GB" smtClean="0"/>
-              <a:t>12/06/2023</a:t>
+              <a:t>14/06/2023</a:t>
             </a:fld>
             <a:endParaRPr lang="en-GB"/>
           </a:p>
@@ -1423,7 +1424,7 @@
           <a:p>
             <a:fld id="{4F434B10-FAB1-4BEF-A575-45F3C0A8F2CA}" type="datetimeFigureOut">
               <a:rPr lang="en-GB" smtClean="0"/>
-              <a:t>12/06/2023</a:t>
+              <a:t>14/06/2023</a:t>
             </a:fld>
             <a:endParaRPr lang="en-GB"/>
           </a:p>
@@ -1838,7 +1839,7 @@
           <a:p>
             <a:fld id="{4F434B10-FAB1-4BEF-A575-45F3C0A8F2CA}" type="datetimeFigureOut">
               <a:rPr lang="en-GB" smtClean="0"/>
-              <a:t>12/06/2023</a:t>
+              <a:t>14/06/2023</a:t>
             </a:fld>
             <a:endParaRPr lang="en-GB"/>
           </a:p>
@@ -1980,7 +1981,7 @@
           <a:p>
             <a:fld id="{4F434B10-FAB1-4BEF-A575-45F3C0A8F2CA}" type="datetimeFigureOut">
               <a:rPr lang="en-GB" smtClean="0"/>
-              <a:t>12/06/2023</a:t>
+              <a:t>14/06/2023</a:t>
             </a:fld>
             <a:endParaRPr lang="en-GB"/>
           </a:p>
@@ -2093,7 +2094,7 @@
           <a:p>
             <a:fld id="{4F434B10-FAB1-4BEF-A575-45F3C0A8F2CA}" type="datetimeFigureOut">
               <a:rPr lang="en-GB" smtClean="0"/>
-              <a:t>12/06/2023</a:t>
+              <a:t>14/06/2023</a:t>
             </a:fld>
             <a:endParaRPr lang="en-GB"/>
           </a:p>
@@ -2406,7 +2407,7 @@
           <a:p>
             <a:fld id="{4F434B10-FAB1-4BEF-A575-45F3C0A8F2CA}" type="datetimeFigureOut">
               <a:rPr lang="en-GB" smtClean="0"/>
-              <a:t>12/06/2023</a:t>
+              <a:t>14/06/2023</a:t>
             </a:fld>
             <a:endParaRPr lang="en-GB"/>
           </a:p>
@@ -2695,7 +2696,7 @@
           <a:p>
             <a:fld id="{4F434B10-FAB1-4BEF-A575-45F3C0A8F2CA}" type="datetimeFigureOut">
               <a:rPr lang="en-GB" smtClean="0"/>
-              <a:t>12/06/2023</a:t>
+              <a:t>14/06/2023</a:t>
             </a:fld>
             <a:endParaRPr lang="en-GB"/>
           </a:p>
@@ -2938,7 +2939,7 @@
           <a:p>
             <a:fld id="{4F434B10-FAB1-4BEF-A575-45F3C0A8F2CA}" type="datetimeFigureOut">
               <a:rPr lang="en-GB" smtClean="0"/>
-              <a:t>12/06/2023</a:t>
+              <a:t>14/06/2023</a:t>
             </a:fld>
             <a:endParaRPr lang="en-GB"/>
           </a:p>
@@ -3424,6 +3425,134 @@
 </p:sld>
 </file>
 
+<file path=ppt/slides/slide10.xml><?xml version="1.0" encoding="utf-8"?>
+<p:sld xmlns:a="http://schemas.openxmlformats.org/drawingml/2006/main" xmlns:r="http://schemas.openxmlformats.org/officeDocument/2006/relationships" xmlns:p="http://schemas.openxmlformats.org/presentationml/2006/main">
+  <p:cSld>
+    <p:spTree>
+      <p:nvGrpSpPr>
+        <p:cNvPr id="1" name=""/>
+        <p:cNvGrpSpPr/>
+        <p:nvPr/>
+      </p:nvGrpSpPr>
+      <p:grpSpPr>
+        <a:xfrm>
+          <a:off x="0" y="0"/>
+          <a:ext cx="0" cy="0"/>
+          <a:chOff x="0" y="0"/>
+          <a:chExt cx="0" cy="0"/>
+        </a:xfrm>
+      </p:grpSpPr>
+      <p:sp>
+        <p:nvSpPr>
+          <p:cNvPr id="2" name="Title 1">
+            <a:extLst>
+              <a:ext uri="{FF2B5EF4-FFF2-40B4-BE49-F238E27FC236}">
+                <a16:creationId xmlns:a16="http://schemas.microsoft.com/office/drawing/2014/main" id="{F1E9AB5F-A584-AF38-532A-56E890561A02}"/>
+              </a:ext>
+            </a:extLst>
+          </p:cNvPr>
+          <p:cNvSpPr>
+            <a:spLocks noGrp="1"/>
+          </p:cNvSpPr>
+          <p:nvPr>
+            <p:ph type="title"/>
+          </p:nvPr>
+        </p:nvSpPr>
+        <p:spPr/>
+        <p:txBody>
+          <a:bodyPr/>
+          <a:lstStyle/>
+          <a:p>
+            <a:r>
+              <a:rPr lang="en-GB" dirty="0"/>
+              <a:t>wireframes</a:t>
+            </a:r>
+          </a:p>
+        </p:txBody>
+      </p:sp>
+      <p:pic>
+        <p:nvPicPr>
+          <p:cNvPr id="6" name="Content Placeholder 5" descr="A screenshot of a search box&#10;&#10;Description automatically generated with low confidence">
+            <a:extLst>
+              <a:ext uri="{FF2B5EF4-FFF2-40B4-BE49-F238E27FC236}">
+                <a16:creationId xmlns:a16="http://schemas.microsoft.com/office/drawing/2014/main" id="{AC2A1E7F-C079-EA2D-7A4B-CA26ACAC7217}"/>
+              </a:ext>
+            </a:extLst>
+          </p:cNvPr>
+          <p:cNvPicPr>
+            <a:picLocks noGrp="1" noChangeAspect="1"/>
+          </p:cNvPicPr>
+          <p:nvPr>
+            <p:ph sz="half" idx="1"/>
+          </p:nvPr>
+        </p:nvPicPr>
+        <p:blipFill>
+          <a:blip r:embed="rId2">
+            <a:extLst>
+              <a:ext uri="{28A0092B-C50C-407E-A947-70E740481C1C}">
+                <a14:useLocalDpi xmlns:a14="http://schemas.microsoft.com/office/drawing/2010/main" val="0"/>
+              </a:ext>
+            </a:extLst>
+          </a:blip>
+          <a:stretch>
+            <a:fillRect/>
+          </a:stretch>
+        </p:blipFill>
+        <p:spPr>
+          <a:xfrm>
+            <a:off x="838200" y="2087663"/>
+            <a:ext cx="5181600" cy="3827261"/>
+          </a:xfrm>
+        </p:spPr>
+      </p:pic>
+      <p:pic>
+        <p:nvPicPr>
+          <p:cNvPr id="12" name="Content Placeholder 11" descr="A screenshot of a computer&#10;&#10;Description automatically generated with medium confidence">
+            <a:extLst>
+              <a:ext uri="{FF2B5EF4-FFF2-40B4-BE49-F238E27FC236}">
+                <a16:creationId xmlns:a16="http://schemas.microsoft.com/office/drawing/2014/main" id="{5D38BAE2-B258-12E4-BAAC-5C2BAD59D1F0}"/>
+              </a:ext>
+            </a:extLst>
+          </p:cNvPr>
+          <p:cNvPicPr>
+            <a:picLocks noGrp="1" noChangeAspect="1"/>
+          </p:cNvPicPr>
+          <p:nvPr>
+            <p:ph sz="half" idx="2"/>
+          </p:nvPr>
+        </p:nvPicPr>
+        <p:blipFill>
+          <a:blip r:embed="rId3">
+            <a:extLst>
+              <a:ext uri="{28A0092B-C50C-407E-A947-70E740481C1C}">
+                <a14:useLocalDpi xmlns:a14="http://schemas.microsoft.com/office/drawing/2010/main" val="0"/>
+              </a:ext>
+            </a:extLst>
+          </a:blip>
+          <a:stretch>
+            <a:fillRect/>
+          </a:stretch>
+        </p:blipFill>
+        <p:spPr>
+          <a:xfrm>
+            <a:off x="6172200" y="2066457"/>
+            <a:ext cx="5181600" cy="3869673"/>
+          </a:xfrm>
+        </p:spPr>
+      </p:pic>
+    </p:spTree>
+    <p:extLst>
+      <p:ext uri="{BB962C8B-B14F-4D97-AF65-F5344CB8AC3E}">
+        <p14:creationId xmlns:p14="http://schemas.microsoft.com/office/powerpoint/2010/main" val="3771815473"/>
+      </p:ext>
+    </p:extLst>
+  </p:cSld>
+  <p:clrMapOvr>
+    <a:masterClrMapping/>
+  </p:clrMapOvr>
+</p:sld>
+</file>
+
 <file path=ppt/slides/slide2.xml><?xml version="1.0" encoding="utf-8"?>
 <p:sld xmlns:a="http://schemas.openxmlformats.org/drawingml/2006/main" xmlns:r="http://schemas.openxmlformats.org/officeDocument/2006/relationships" xmlns:p="http://schemas.openxmlformats.org/presentationml/2006/main">
   <p:cSld>
@@ -3640,7 +3769,7 @@
                 <a:latin typeface="Arial" panose="020B0604020202020204" pitchFamily="34" charset="0"/>
                 <a:ea typeface="Calibri" panose="020F0502020204030204" pitchFamily="34" charset="0"/>
               </a:rPr>
-              <a:t>This site would basically be a search engine where someone could input what they are looking for and the site would show places where that item is discounted due to nearly going out of date.</a:t>
+              <a:t>This site would basically be a search engine where someone could input what they are looking for and the site would show places where that item is.</a:t>
             </a:r>
             <a:endParaRPr lang="en-GB" sz="1800" dirty="0">
               <a:latin typeface="Arial" panose="020B0604020202020204" pitchFamily="34" charset="0"/>
@@ -3774,7 +3903,7 @@
           <a:p>
             <a:r>
               <a:rPr lang="en-GB" dirty="0"/>
-              <a:t>Could Have - Automated updating of discounted products</a:t>
+              <a:t>Could Have - Automated updating of products</a:t>
             </a:r>
           </a:p>
           <a:p>
@@ -4408,7 +4537,7 @@
           <p:cNvPr id="2" name="Title 1">
             <a:extLst>
               <a:ext uri="{FF2B5EF4-FFF2-40B4-BE49-F238E27FC236}">
-                <a16:creationId xmlns:a16="http://schemas.microsoft.com/office/drawing/2014/main" id="{F1E9AB5F-A584-AF38-532A-56E890561A02}"/>
+                <a16:creationId xmlns:a16="http://schemas.microsoft.com/office/drawing/2014/main" id="{C5A49108-0DAE-5A4B-BB72-19A74121B778}"/>
               </a:ext>
             </a:extLst>
           </p:cNvPr>
@@ -4426,17 +4555,17 @@
           <a:p>
             <a:r>
               <a:rPr lang="en-GB" dirty="0"/>
-              <a:t>wireframes</a:t>
+              <a:t>Class diagram</a:t>
             </a:r>
           </a:p>
         </p:txBody>
       </p:sp>
       <p:pic>
         <p:nvPicPr>
-          <p:cNvPr id="6" name="Content Placeholder 5" descr="A screenshot of a search box&#10;&#10;Description automatically generated with low confidence">
-            <a:extLst>
-              <a:ext uri="{FF2B5EF4-FFF2-40B4-BE49-F238E27FC236}">
-                <a16:creationId xmlns:a16="http://schemas.microsoft.com/office/drawing/2014/main" id="{AC2A1E7F-C079-EA2D-7A4B-CA26ACAC7217}"/>
+          <p:cNvPr id="5" name="Content Placeholder 4" descr="A picture containing text, screenshot, black&#10;&#10;Description automatically generated">
+            <a:extLst>
+              <a:ext uri="{FF2B5EF4-FFF2-40B4-BE49-F238E27FC236}">
+                <a16:creationId xmlns:a16="http://schemas.microsoft.com/office/drawing/2014/main" id="{BC0F3775-D96B-D8DF-7E6A-04BD2D730AE0}"/>
               </a:ext>
             </a:extLst>
           </p:cNvPr>
@@ -4444,7 +4573,7 @@
             <a:picLocks noGrp="1" noChangeAspect="1"/>
           </p:cNvPicPr>
           <p:nvPr>
-            <p:ph sz="half" idx="1"/>
+            <p:ph idx="1"/>
           </p:nvPr>
         </p:nvPicPr>
         <p:blipFill>
@@ -4461,50 +4590,15 @@
         </p:blipFill>
         <p:spPr>
           <a:xfrm>
-            <a:off x="838200" y="2087663"/>
-            <a:ext cx="5181600" cy="3827261"/>
-          </a:xfrm>
-        </p:spPr>
-      </p:pic>
-      <p:pic>
-        <p:nvPicPr>
-          <p:cNvPr id="12" name="Content Placeholder 11" descr="A screenshot of a computer&#10;&#10;Description automatically generated with medium confidence">
-            <a:extLst>
-              <a:ext uri="{FF2B5EF4-FFF2-40B4-BE49-F238E27FC236}">
-                <a16:creationId xmlns:a16="http://schemas.microsoft.com/office/drawing/2014/main" id="{5D38BAE2-B258-12E4-BAAC-5C2BAD59D1F0}"/>
-              </a:ext>
-            </a:extLst>
-          </p:cNvPr>
-          <p:cNvPicPr>
-            <a:picLocks noGrp="1" noChangeAspect="1"/>
-          </p:cNvPicPr>
-          <p:nvPr>
-            <p:ph sz="half" idx="2"/>
-          </p:nvPr>
-        </p:nvPicPr>
-        <p:blipFill>
-          <a:blip r:embed="rId3">
-            <a:extLst>
-              <a:ext uri="{28A0092B-C50C-407E-A947-70E740481C1C}">
-                <a14:useLocalDpi xmlns:a14="http://schemas.microsoft.com/office/drawing/2010/main" val="0"/>
-              </a:ext>
-            </a:extLst>
-          </a:blip>
-          <a:stretch>
-            <a:fillRect/>
-          </a:stretch>
-        </p:blipFill>
-        <p:spPr>
-          <a:xfrm>
-            <a:off x="6172200" y="2066457"/>
-            <a:ext cx="5181600" cy="3869673"/>
+            <a:off x="555612" y="2673441"/>
+            <a:ext cx="10201275" cy="2095500"/>
           </a:xfrm>
         </p:spPr>
       </p:pic>
     </p:spTree>
     <p:extLst>
       <p:ext uri="{BB962C8B-B14F-4D97-AF65-F5344CB8AC3E}">
-        <p14:creationId xmlns:p14="http://schemas.microsoft.com/office/powerpoint/2010/main" val="3771815473"/>
+        <p14:creationId xmlns:p14="http://schemas.microsoft.com/office/powerpoint/2010/main" val="2179144815"/>
       </p:ext>
     </p:extLst>
   </p:cSld>

</xml_diff>

<commit_message>
Added a theoretical gantt chart
</commit_message>
<xml_diff>
--- a/Files/Synoptic project 2023.pptx
+++ b/Files/Synoptic project 2023.pptx
@@ -8,13 +8,14 @@
     <p:sldId id="256" r:id="rId2"/>
     <p:sldId id="257" r:id="rId3"/>
     <p:sldId id="261" r:id="rId4"/>
-    <p:sldId id="262" r:id="rId5"/>
-    <p:sldId id="258" r:id="rId6"/>
-    <p:sldId id="259" r:id="rId7"/>
-    <p:sldId id="260" r:id="rId8"/>
-    <p:sldId id="265" r:id="rId9"/>
-    <p:sldId id="264" r:id="rId10"/>
-    <p:sldId id="263" r:id="rId11"/>
+    <p:sldId id="266" r:id="rId5"/>
+    <p:sldId id="262" r:id="rId6"/>
+    <p:sldId id="258" r:id="rId7"/>
+    <p:sldId id="259" r:id="rId8"/>
+    <p:sldId id="260" r:id="rId9"/>
+    <p:sldId id="265" r:id="rId10"/>
+    <p:sldId id="264" r:id="rId11"/>
+    <p:sldId id="263" r:id="rId12"/>
   </p:sldIdLst>
   <p:sldSz cx="12192000" cy="6858000"/>
   <p:notesSz cx="6858000" cy="9144000"/>
@@ -3447,6 +3448,99 @@
           <p:cNvPr id="2" name="Title 1">
             <a:extLst>
               <a:ext uri="{FF2B5EF4-FFF2-40B4-BE49-F238E27FC236}">
+                <a16:creationId xmlns:a16="http://schemas.microsoft.com/office/drawing/2014/main" id="{9CD91D97-1A29-C375-BE76-83DE0B3EEAEF}"/>
+              </a:ext>
+            </a:extLst>
+          </p:cNvPr>
+          <p:cNvSpPr>
+            <a:spLocks noGrp="1"/>
+          </p:cNvSpPr>
+          <p:nvPr>
+            <p:ph type="title"/>
+          </p:nvPr>
+        </p:nvSpPr>
+        <p:spPr/>
+        <p:txBody>
+          <a:bodyPr/>
+          <a:lstStyle/>
+          <a:p>
+            <a:r>
+              <a:rPr lang="en-GB" dirty="0"/>
+              <a:t>Use Case Diagram</a:t>
+            </a:r>
+          </a:p>
+        </p:txBody>
+      </p:sp>
+      <p:pic>
+        <p:nvPicPr>
+          <p:cNvPr id="5" name="Content Placeholder 4" descr="A diagram of a product&#10;&#10;Description automatically generated with low confidence">
+            <a:extLst>
+              <a:ext uri="{FF2B5EF4-FFF2-40B4-BE49-F238E27FC236}">
+                <a16:creationId xmlns:a16="http://schemas.microsoft.com/office/drawing/2014/main" id="{744E3040-6087-9B57-CC90-1C9A74B2C9A5}"/>
+              </a:ext>
+            </a:extLst>
+          </p:cNvPr>
+          <p:cNvPicPr>
+            <a:picLocks noGrp="1" noChangeAspect="1"/>
+          </p:cNvPicPr>
+          <p:nvPr>
+            <p:ph idx="1"/>
+          </p:nvPr>
+        </p:nvPicPr>
+        <p:blipFill>
+          <a:blip r:embed="rId2">
+            <a:extLst>
+              <a:ext uri="{28A0092B-C50C-407E-A947-70E740481C1C}">
+                <a14:useLocalDpi xmlns:a14="http://schemas.microsoft.com/office/drawing/2010/main" val="0"/>
+              </a:ext>
+            </a:extLst>
+          </a:blip>
+          <a:stretch>
+            <a:fillRect/>
+          </a:stretch>
+        </p:blipFill>
+        <p:spPr>
+          <a:xfrm>
+            <a:off x="2909054" y="1825625"/>
+            <a:ext cx="6373891" cy="4351338"/>
+          </a:xfrm>
+        </p:spPr>
+      </p:pic>
+    </p:spTree>
+    <p:extLst>
+      <p:ext uri="{BB962C8B-B14F-4D97-AF65-F5344CB8AC3E}">
+        <p14:creationId xmlns:p14="http://schemas.microsoft.com/office/powerpoint/2010/main" val="1069822731"/>
+      </p:ext>
+    </p:extLst>
+  </p:cSld>
+  <p:clrMapOvr>
+    <a:masterClrMapping/>
+  </p:clrMapOvr>
+</p:sld>
+</file>
+
+<file path=ppt/slides/slide11.xml><?xml version="1.0" encoding="utf-8"?>
+<p:sld xmlns:a="http://schemas.openxmlformats.org/drawingml/2006/main" xmlns:r="http://schemas.openxmlformats.org/officeDocument/2006/relationships" xmlns:p="http://schemas.openxmlformats.org/presentationml/2006/main">
+  <p:cSld>
+    <p:spTree>
+      <p:nvGrpSpPr>
+        <p:cNvPr id="1" name=""/>
+        <p:cNvGrpSpPr/>
+        <p:nvPr/>
+      </p:nvGrpSpPr>
+      <p:grpSpPr>
+        <a:xfrm>
+          <a:off x="0" y="0"/>
+          <a:ext cx="0" cy="0"/>
+          <a:chOff x="0" y="0"/>
+          <a:chExt cx="0" cy="0"/>
+        </a:xfrm>
+      </p:grpSpPr>
+      <p:sp>
+        <p:nvSpPr>
+          <p:cNvPr id="2" name="Title 1">
+            <a:extLst>
+              <a:ext uri="{FF2B5EF4-FFF2-40B4-BE49-F238E27FC236}">
                 <a16:creationId xmlns:a16="http://schemas.microsoft.com/office/drawing/2014/main" id="{F1E9AB5F-A584-AF38-532A-56E890561A02}"/>
               </a:ext>
             </a:extLst>
@@ -3824,7 +3918,7 @@
           <p:cNvPr id="2" name="Title 1">
             <a:extLst>
               <a:ext uri="{FF2B5EF4-FFF2-40B4-BE49-F238E27FC236}">
-                <a16:creationId xmlns:a16="http://schemas.microsoft.com/office/drawing/2014/main" id="{A56E59A7-E4F6-C320-FF35-FE85B2E48120}"/>
+                <a16:creationId xmlns:a16="http://schemas.microsoft.com/office/drawing/2014/main" id="{5FD201C8-9D99-410A-EC29-2A2E84ED8FE3}"/>
               </a:ext>
             </a:extLst>
           </p:cNvPr>
@@ -3841,95 +3935,51 @@
           <a:lstStyle/>
           <a:p>
             <a:r>
-              <a:rPr lang="en-GB" dirty="0" err="1"/>
-              <a:t>MoSCoW</a:t>
-            </a:r>
-            <a:endParaRPr lang="en-GB" dirty="0"/>
-          </a:p>
-        </p:txBody>
-      </p:sp>
-      <p:sp>
-        <p:nvSpPr>
-          <p:cNvPr id="3" name="Content Placeholder 2">
-            <a:extLst>
-              <a:ext uri="{FF2B5EF4-FFF2-40B4-BE49-F238E27FC236}">
-                <a16:creationId xmlns:a16="http://schemas.microsoft.com/office/drawing/2014/main" id="{A862A7FC-9594-60A9-20B0-10A047EA5467}"/>
-              </a:ext>
-            </a:extLst>
-          </p:cNvPr>
-          <p:cNvSpPr>
-            <a:spLocks noGrp="1"/>
-          </p:cNvSpPr>
+              <a:rPr lang="en-GB" dirty="0"/>
+              <a:t>Gantt charts</a:t>
+            </a:r>
+          </a:p>
+        </p:txBody>
+      </p:sp>
+      <p:pic>
+        <p:nvPicPr>
+          <p:cNvPr id="5" name="Content Placeholder 4" descr="A screenshot of a computer&#10;&#10;Description automatically generated with medium confidence">
+            <a:extLst>
+              <a:ext uri="{FF2B5EF4-FFF2-40B4-BE49-F238E27FC236}">
+                <a16:creationId xmlns:a16="http://schemas.microsoft.com/office/drawing/2014/main" id="{14E65E0A-E5C6-E2E9-302E-38B82A5B365F}"/>
+              </a:ext>
+            </a:extLst>
+          </p:cNvPr>
+          <p:cNvPicPr>
+            <a:picLocks noGrp="1" noChangeAspect="1"/>
+          </p:cNvPicPr>
           <p:nvPr>
             <p:ph idx="1"/>
           </p:nvPr>
-        </p:nvSpPr>
-        <p:spPr/>
-        <p:txBody>
-          <a:bodyPr>
-            <a:normAutofit lnSpcReduction="10000"/>
-          </a:bodyPr>
-          <a:lstStyle/>
-          <a:p>
-            <a:r>
-              <a:rPr lang="en-GB" dirty="0"/>
-              <a:t>Must Have - way to view and add products</a:t>
-            </a:r>
-          </a:p>
-          <a:p>
-            <a:r>
-              <a:rPr lang="en-GB" dirty="0"/>
-              <a:t>Must Have - Way to sort through products</a:t>
-            </a:r>
-          </a:p>
-          <a:p>
-            <a:r>
-              <a:rPr lang="en-GB" dirty="0"/>
-              <a:t>Should Have - Access for featurephones</a:t>
-            </a:r>
-          </a:p>
-          <a:p>
-            <a:r>
-              <a:rPr lang="en-GB" dirty="0"/>
-              <a:t>Should Have - Addresses for Shops</a:t>
-            </a:r>
-          </a:p>
-          <a:p>
-            <a:r>
-              <a:rPr lang="en-GB" dirty="0"/>
-              <a:t>Should Have - Low data/internet requirements</a:t>
-            </a:r>
-          </a:p>
-          <a:p>
-            <a:r>
-              <a:rPr lang="en-GB" dirty="0"/>
-              <a:t>Could Have - Automated updating of products</a:t>
-            </a:r>
-          </a:p>
-          <a:p>
-            <a:r>
-              <a:rPr lang="en-GB" dirty="0"/>
-              <a:t>Could Have - Ability to change ordering of results</a:t>
-            </a:r>
-          </a:p>
-          <a:p>
-            <a:r>
-              <a:rPr lang="en-GB" dirty="0"/>
-              <a:t>Won’t Have - Maps/Directions</a:t>
-            </a:r>
-          </a:p>
-          <a:p>
-            <a:r>
-              <a:rPr lang="en-GB" dirty="0"/>
-              <a:t>Won’t Have - Recommendations for shops</a:t>
-            </a:r>
-          </a:p>
-        </p:txBody>
-      </p:sp>
+        </p:nvPicPr>
+        <p:blipFill>
+          <a:blip r:embed="rId2">
+            <a:extLst>
+              <a:ext uri="{28A0092B-C50C-407E-A947-70E740481C1C}">
+                <a14:useLocalDpi xmlns:a14="http://schemas.microsoft.com/office/drawing/2010/main" val="0"/>
+              </a:ext>
+            </a:extLst>
+          </a:blip>
+          <a:stretch>
+            <a:fillRect/>
+          </a:stretch>
+        </p:blipFill>
+        <p:spPr>
+          <a:xfrm>
+            <a:off x="1297459" y="1610088"/>
+            <a:ext cx="8941347" cy="4647194"/>
+          </a:xfrm>
+        </p:spPr>
+      </p:pic>
     </p:spTree>
     <p:extLst>
       <p:ext uri="{BB962C8B-B14F-4D97-AF65-F5344CB8AC3E}">
-        <p14:creationId xmlns:p14="http://schemas.microsoft.com/office/powerpoint/2010/main" val="3149481395"/>
+        <p14:creationId xmlns:p14="http://schemas.microsoft.com/office/powerpoint/2010/main" val="249455737"/>
       </p:ext>
     </p:extLst>
   </p:cSld>
@@ -3961,7 +4011,7 @@
           <p:cNvPr id="2" name="Title 1">
             <a:extLst>
               <a:ext uri="{FF2B5EF4-FFF2-40B4-BE49-F238E27FC236}">
-                <a16:creationId xmlns:a16="http://schemas.microsoft.com/office/drawing/2014/main" id="{FBB7097A-F30F-F7D9-8BA1-D3885566E1C3}"/>
+                <a16:creationId xmlns:a16="http://schemas.microsoft.com/office/drawing/2014/main" id="{A56E59A7-E4F6-C320-FF35-FE85B2E48120}"/>
               </a:ext>
             </a:extLst>
           </p:cNvPr>
@@ -3978,170 +4028,95 @@
           <a:lstStyle/>
           <a:p>
             <a:r>
+              <a:rPr lang="en-GB" dirty="0" err="1"/>
+              <a:t>MoSCoW</a:t>
+            </a:r>
+            <a:endParaRPr lang="en-GB" dirty="0"/>
+          </a:p>
+        </p:txBody>
+      </p:sp>
+      <p:sp>
+        <p:nvSpPr>
+          <p:cNvPr id="3" name="Content Placeholder 2">
+            <a:extLst>
+              <a:ext uri="{FF2B5EF4-FFF2-40B4-BE49-F238E27FC236}">
+                <a16:creationId xmlns:a16="http://schemas.microsoft.com/office/drawing/2014/main" id="{A862A7FC-9594-60A9-20B0-10A047EA5467}"/>
+              </a:ext>
+            </a:extLst>
+          </p:cNvPr>
+          <p:cNvSpPr>
+            <a:spLocks noGrp="1"/>
+          </p:cNvSpPr>
+          <p:nvPr>
+            <p:ph idx="1"/>
+          </p:nvPr>
+        </p:nvSpPr>
+        <p:spPr/>
+        <p:txBody>
+          <a:bodyPr>
+            <a:normAutofit lnSpcReduction="10000"/>
+          </a:bodyPr>
+          <a:lstStyle/>
+          <a:p>
+            <a:r>
               <a:rPr lang="en-GB" dirty="0"/>
-              <a:t>Persona: </a:t>
-            </a:r>
-            <a:r>
-              <a:rPr lang="en-GB" dirty="0" err="1"/>
-              <a:t>Abigal</a:t>
-            </a:r>
-            <a:endParaRPr lang="en-GB" dirty="0"/>
-          </a:p>
-        </p:txBody>
-      </p:sp>
-      <p:sp>
-        <p:nvSpPr>
-          <p:cNvPr id="3" name="Content Placeholder 2">
-            <a:extLst>
-              <a:ext uri="{FF2B5EF4-FFF2-40B4-BE49-F238E27FC236}">
-                <a16:creationId xmlns:a16="http://schemas.microsoft.com/office/drawing/2014/main" id="{713E7000-348E-DA85-18D6-7FD9C7390DE5}"/>
-              </a:ext>
-            </a:extLst>
-          </p:cNvPr>
-          <p:cNvSpPr>
-            <a:spLocks noGrp="1"/>
-          </p:cNvSpPr>
-          <p:nvPr>
-            <p:ph idx="1"/>
-          </p:nvPr>
-        </p:nvSpPr>
-        <p:spPr/>
-        <p:txBody>
-          <a:bodyPr>
-            <a:normAutofit/>
-          </a:bodyPr>
-          <a:lstStyle/>
-          <a:p>
-            <a:pPr>
-              <a:lnSpc>
-                <a:spcPct val="107000"/>
-              </a:lnSpc>
-              <a:spcAft>
-                <a:spcPts val="800"/>
-              </a:spcAft>
-            </a:pPr>
-            <a:r>
-              <a:rPr lang="en-GB" sz="1800" dirty="0" err="1">
-                <a:latin typeface="Calibri" panose="020F0502020204030204" pitchFamily="34" charset="0"/>
-                <a:ea typeface="Calibri" panose="020F0502020204030204" pitchFamily="34" charset="0"/>
-                <a:cs typeface="Times New Roman" panose="02020603050405020304" pitchFamily="18" charset="0"/>
-              </a:rPr>
-              <a:t>Abigal</a:t>
-            </a:r>
-            <a:r>
-              <a:rPr lang="en-GB" sz="1800" dirty="0">
-                <a:effectLst/>
-                <a:latin typeface="Calibri" panose="020F0502020204030204" pitchFamily="34" charset="0"/>
-                <a:ea typeface="Calibri" panose="020F0502020204030204" pitchFamily="34" charset="0"/>
-                <a:cs typeface="Times New Roman" panose="02020603050405020304" pitchFamily="18" charset="0"/>
-              </a:rPr>
-              <a:t> is a Roma immigrant who came here a month ago. She currently relies heavily on the government Food stamps and food banks to support herself. She has a decent understanding of English, not fluent but enough to understand labels on products. She’s single, and most of her family remained in her home country. Due to her needs for food, she finds balancing getting sufficient food with food she finds important, such as </a:t>
-            </a:r>
-            <a:r>
-              <a:rPr lang="en-GB" sz="1800" dirty="0" err="1">
-                <a:effectLst/>
-                <a:latin typeface="Calibri" panose="020F0502020204030204" pitchFamily="34" charset="0"/>
-                <a:ea typeface="Calibri" panose="020F0502020204030204" pitchFamily="34" charset="0"/>
-                <a:cs typeface="Times New Roman" panose="02020603050405020304" pitchFamily="18" charset="0"/>
-              </a:rPr>
-              <a:t>pirogo</a:t>
-            </a:r>
-            <a:r>
-              <a:rPr lang="en-GB" sz="1800" dirty="0">
-                <a:effectLst/>
-                <a:latin typeface="Calibri" panose="020F0502020204030204" pitchFamily="34" charset="0"/>
-                <a:ea typeface="Calibri" panose="020F0502020204030204" pitchFamily="34" charset="0"/>
-                <a:cs typeface="Times New Roman" panose="02020603050405020304" pitchFamily="18" charset="0"/>
-              </a:rPr>
-              <a:t>. She also finds it hard to differentiate and is concerned that some supermarkets may be selling horse meat, which her culture forbids her from eating.</a:t>
-            </a:r>
-          </a:p>
-          <a:p>
-            <a:pPr marL="0" indent="0">
-              <a:lnSpc>
-                <a:spcPct val="107000"/>
-              </a:lnSpc>
-              <a:spcAft>
-                <a:spcPts val="800"/>
-              </a:spcAft>
-              <a:buNone/>
-            </a:pPr>
-            <a:r>
-              <a:rPr lang="en-GB" sz="1800" dirty="0">
-                <a:effectLst/>
-                <a:latin typeface="Calibri" panose="020F0502020204030204" pitchFamily="34" charset="0"/>
-                <a:ea typeface="Calibri" panose="020F0502020204030204" pitchFamily="34" charset="0"/>
-                <a:cs typeface="Times New Roman" panose="02020603050405020304" pitchFamily="18" charset="0"/>
-              </a:rPr>
-              <a:t>Goals</a:t>
-            </a:r>
-          </a:p>
-          <a:p>
-            <a:pPr>
-              <a:lnSpc>
-                <a:spcPct val="107000"/>
-              </a:lnSpc>
-              <a:spcAft>
-                <a:spcPts val="800"/>
-              </a:spcAft>
-            </a:pPr>
-            <a:r>
-              <a:rPr lang="en-GB" sz="1800" dirty="0">
-                <a:effectLst/>
-                <a:latin typeface="Calibri" panose="020F0502020204030204" pitchFamily="34" charset="0"/>
-                <a:ea typeface="Calibri" panose="020F0502020204030204" pitchFamily="34" charset="0"/>
-                <a:cs typeface="Times New Roman" panose="02020603050405020304" pitchFamily="18" charset="0"/>
-              </a:rPr>
-              <a:t>Eat a healthy balanced diet</a:t>
-            </a:r>
-          </a:p>
-          <a:p>
-            <a:pPr>
-              <a:lnSpc>
-                <a:spcPct val="107000"/>
-              </a:lnSpc>
-              <a:spcAft>
-                <a:spcPts val="800"/>
-              </a:spcAft>
-            </a:pPr>
-            <a:r>
-              <a:rPr lang="en-GB" sz="1800" dirty="0">
-                <a:effectLst/>
-                <a:latin typeface="Calibri" panose="020F0502020204030204" pitchFamily="34" charset="0"/>
-                <a:ea typeface="Calibri" panose="020F0502020204030204" pitchFamily="34" charset="0"/>
-                <a:cs typeface="Times New Roman" panose="02020603050405020304" pitchFamily="18" charset="0"/>
-              </a:rPr>
-              <a:t>Eat more of the foods she grew up eating (Romani foods)</a:t>
-            </a:r>
-          </a:p>
-          <a:p>
-            <a:pPr>
-              <a:lnSpc>
-                <a:spcPct val="107000"/>
-              </a:lnSpc>
-              <a:spcAft>
-                <a:spcPts val="800"/>
-              </a:spcAft>
-            </a:pPr>
-            <a:r>
-              <a:rPr lang="en-GB" sz="1800" dirty="0">
-                <a:effectLst/>
-                <a:latin typeface="Calibri" panose="020F0502020204030204" pitchFamily="34" charset="0"/>
-                <a:ea typeface="Calibri" panose="020F0502020204030204" pitchFamily="34" charset="0"/>
-                <a:cs typeface="Times New Roman" panose="02020603050405020304" pitchFamily="18" charset="0"/>
-              </a:rPr>
-              <a:t>Learn more English and communicate better</a:t>
-            </a:r>
-          </a:p>
-          <a:p>
-            <a:endParaRPr lang="en-GB" dirty="0"/>
+              <a:t>Must Have - way to view and add products</a:t>
+            </a:r>
+          </a:p>
+          <a:p>
+            <a:r>
+              <a:rPr lang="en-GB" dirty="0"/>
+              <a:t>Must Have - Way to sort through products</a:t>
+            </a:r>
+          </a:p>
+          <a:p>
+            <a:r>
+              <a:rPr lang="en-GB" dirty="0"/>
+              <a:t>Should Have - Access for featurephones</a:t>
+            </a:r>
+          </a:p>
+          <a:p>
+            <a:r>
+              <a:rPr lang="en-GB" dirty="0"/>
+              <a:t>Should Have - Addresses for Shops</a:t>
+            </a:r>
+          </a:p>
+          <a:p>
+            <a:r>
+              <a:rPr lang="en-GB" dirty="0"/>
+              <a:t>Should Have - Low data/internet requirements</a:t>
+            </a:r>
+          </a:p>
+          <a:p>
+            <a:r>
+              <a:rPr lang="en-GB" dirty="0"/>
+              <a:t>Could Have - Automated updating of products</a:t>
+            </a:r>
+          </a:p>
+          <a:p>
+            <a:r>
+              <a:rPr lang="en-GB" dirty="0"/>
+              <a:t>Could Have - Ability to change ordering of results</a:t>
+            </a:r>
+          </a:p>
+          <a:p>
+            <a:r>
+              <a:rPr lang="en-GB" dirty="0"/>
+              <a:t>Won’t Have - Maps/Directions</a:t>
+            </a:r>
+          </a:p>
+          <a:p>
+            <a:r>
+              <a:rPr lang="en-GB" dirty="0"/>
+              <a:t>Won’t Have - Recommendations for shops</a:t>
+            </a:r>
           </a:p>
         </p:txBody>
       </p:sp>
     </p:spTree>
     <p:extLst>
       <p:ext uri="{BB962C8B-B14F-4D97-AF65-F5344CB8AC3E}">
-        <p14:creationId xmlns:p14="http://schemas.microsoft.com/office/powerpoint/2010/main" val="932567577"/>
+        <p14:creationId xmlns:p14="http://schemas.microsoft.com/office/powerpoint/2010/main" val="3149481395"/>
       </p:ext>
     </p:extLst>
   </p:cSld>
@@ -4173,7 +4148,7 @@
           <p:cNvPr id="2" name="Title 1">
             <a:extLst>
               <a:ext uri="{FF2B5EF4-FFF2-40B4-BE49-F238E27FC236}">
-                <a16:creationId xmlns:a16="http://schemas.microsoft.com/office/drawing/2014/main" id="{3187BC2A-8827-FCB5-0594-9BAA7F326741}"/>
+                <a16:creationId xmlns:a16="http://schemas.microsoft.com/office/drawing/2014/main" id="{FBB7097A-F30F-F7D9-8BA1-D3885566E1C3}"/>
               </a:ext>
             </a:extLst>
           </p:cNvPr>
@@ -4191,8 +4166,13 @@
           <a:p>
             <a:r>
               <a:rPr lang="en-GB" dirty="0"/>
-              <a:t>Persona: Hamza</a:t>
-            </a:r>
+              <a:t>Persona: </a:t>
+            </a:r>
+            <a:r>
+              <a:rPr lang="en-GB" dirty="0" err="1"/>
+              <a:t>Abigal</a:t>
+            </a:r>
+            <a:endParaRPr lang="en-GB" dirty="0"/>
           </a:p>
         </p:txBody>
       </p:sp>
@@ -4201,7 +4181,7 @@
           <p:cNvPr id="3" name="Content Placeholder 2">
             <a:extLst>
               <a:ext uri="{FF2B5EF4-FFF2-40B4-BE49-F238E27FC236}">
-                <a16:creationId xmlns:a16="http://schemas.microsoft.com/office/drawing/2014/main" id="{5F237C4E-AF82-7572-DA30-75DEB49290DA}"/>
+                <a16:creationId xmlns:a16="http://schemas.microsoft.com/office/drawing/2014/main" id="{713E7000-348E-DA85-18D6-7FD9C7390DE5}"/>
               </a:ext>
             </a:extLst>
           </p:cNvPr>
@@ -4214,7 +4194,9 @@
         </p:nvSpPr>
         <p:spPr/>
         <p:txBody>
-          <a:bodyPr/>
+          <a:bodyPr>
+            <a:normAutofit/>
+          </a:bodyPr>
           <a:lstStyle/>
           <a:p>
             <a:pPr>
@@ -4226,12 +4208,12 @@
               </a:spcAft>
             </a:pPr>
             <a:r>
-              <a:rPr lang="en-GB" sz="1800" dirty="0">
+              <a:rPr lang="en-GB" sz="1800" dirty="0" err="1">
                 <a:latin typeface="Calibri" panose="020F0502020204030204" pitchFamily="34" charset="0"/>
                 <a:ea typeface="Calibri" panose="020F0502020204030204" pitchFamily="34" charset="0"/>
                 <a:cs typeface="Times New Roman" panose="02020603050405020304" pitchFamily="18" charset="0"/>
               </a:rPr>
-              <a:t>Hamza</a:t>
+              <a:t>Abigal</a:t>
             </a:r>
             <a:r>
               <a:rPr lang="en-GB" sz="1800" dirty="0">
@@ -4240,7 +4222,25 @@
                 <a:ea typeface="Calibri" panose="020F0502020204030204" pitchFamily="34" charset="0"/>
                 <a:cs typeface="Times New Roman" panose="02020603050405020304" pitchFamily="18" charset="0"/>
               </a:rPr>
-              <a:t> is a poor British Muslim who’s lived in Govan all his life. He has consistent shelter and knows his way around the around but is poorly educated and struggles to get and hold a job. He relies on the food banks and stamps. He currently lives with his parents and his two siblings and so food is always fairly stretched. He would like to get a decent job and move out.</a:t>
+              <a:t> is a Roma immigrant who came here a month ago. She currently relies heavily on the government Food stamps and food banks to support herself. She has a decent understanding of English, not fluent but enough to understand labels on products. She’s single, and most of her family remained in her home country. Due to her needs for food, she finds balancing getting sufficient food with food she finds important, such as </a:t>
+            </a:r>
+            <a:r>
+              <a:rPr lang="en-GB" sz="1800" dirty="0" err="1">
+                <a:effectLst/>
+                <a:latin typeface="Calibri" panose="020F0502020204030204" pitchFamily="34" charset="0"/>
+                <a:ea typeface="Calibri" panose="020F0502020204030204" pitchFamily="34" charset="0"/>
+                <a:cs typeface="Times New Roman" panose="02020603050405020304" pitchFamily="18" charset="0"/>
+              </a:rPr>
+              <a:t>pirogo</a:t>
+            </a:r>
+            <a:r>
+              <a:rPr lang="en-GB" sz="1800" dirty="0">
+                <a:effectLst/>
+                <a:latin typeface="Calibri" panose="020F0502020204030204" pitchFamily="34" charset="0"/>
+                <a:ea typeface="Calibri" panose="020F0502020204030204" pitchFamily="34" charset="0"/>
+                <a:cs typeface="Times New Roman" panose="02020603050405020304" pitchFamily="18" charset="0"/>
+              </a:rPr>
+              <a:t>. She also finds it hard to differentiate and is concerned that some supermarkets may be selling horse meat, which her culture forbids her from eating.</a:t>
             </a:r>
           </a:p>
           <a:p>
@@ -4279,7 +4279,7 @@
                 <a:ea typeface="Calibri" panose="020F0502020204030204" pitchFamily="34" charset="0"/>
                 <a:cs typeface="Times New Roman" panose="02020603050405020304" pitchFamily="18" charset="0"/>
               </a:rPr>
-              <a:t>Not to eat Halal</a:t>
+              <a:t>Eat a healthy balanced diet</a:t>
             </a:r>
           </a:p>
           <a:p>
@@ -4298,7 +4298,7 @@
                 <a:ea typeface="Calibri" panose="020F0502020204030204" pitchFamily="34" charset="0"/>
                 <a:cs typeface="Times New Roman" panose="02020603050405020304" pitchFamily="18" charset="0"/>
               </a:rPr>
-              <a:t>Get a decent job and hold it</a:t>
+              <a:t>Eat more of the foods she grew up eating (Romani foods)</a:t>
             </a:r>
           </a:p>
           <a:p>
@@ -4317,7 +4317,7 @@
                 <a:ea typeface="Calibri" panose="020F0502020204030204" pitchFamily="34" charset="0"/>
                 <a:cs typeface="Times New Roman" panose="02020603050405020304" pitchFamily="18" charset="0"/>
               </a:rPr>
-              <a:t>Move out of his parents house</a:t>
+              <a:t>Learn more English and communicate better</a:t>
             </a:r>
           </a:p>
           <a:p>
@@ -4328,7 +4328,7 @@
     </p:spTree>
     <p:extLst>
       <p:ext uri="{BB962C8B-B14F-4D97-AF65-F5344CB8AC3E}">
-        <p14:creationId xmlns:p14="http://schemas.microsoft.com/office/powerpoint/2010/main" val="3017998914"/>
+        <p14:creationId xmlns:p14="http://schemas.microsoft.com/office/powerpoint/2010/main" val="932567577"/>
       </p:ext>
     </p:extLst>
   </p:cSld>
@@ -4360,7 +4360,7 @@
           <p:cNvPr id="2" name="Title 1">
             <a:extLst>
               <a:ext uri="{FF2B5EF4-FFF2-40B4-BE49-F238E27FC236}">
-                <a16:creationId xmlns:a16="http://schemas.microsoft.com/office/drawing/2014/main" id="{CE84747D-D69F-347A-3C06-2AECD6B75E90}"/>
+                <a16:creationId xmlns:a16="http://schemas.microsoft.com/office/drawing/2014/main" id="{3187BC2A-8827-FCB5-0594-9BAA7F326741}"/>
               </a:ext>
             </a:extLst>
           </p:cNvPr>
@@ -4378,7 +4378,7 @@
           <a:p>
             <a:r>
               <a:rPr lang="en-GB" dirty="0"/>
-              <a:t>Stakeholders</a:t>
+              <a:t>Persona: Hamza</a:t>
             </a:r>
           </a:p>
         </p:txBody>
@@ -4388,7 +4388,7 @@
           <p:cNvPr id="3" name="Content Placeholder 2">
             <a:extLst>
               <a:ext uri="{FF2B5EF4-FFF2-40B4-BE49-F238E27FC236}">
-                <a16:creationId xmlns:a16="http://schemas.microsoft.com/office/drawing/2014/main" id="{21B6909D-4262-77DF-A076-BB8FE06EB79E}"/>
+                <a16:creationId xmlns:a16="http://schemas.microsoft.com/office/drawing/2014/main" id="{5F237C4E-AF82-7572-DA30-75DEB49290DA}"/>
               </a:ext>
             </a:extLst>
           </p:cNvPr>
@@ -4414,28 +4414,41 @@
             </a:pPr>
             <a:r>
               <a:rPr lang="en-GB" sz="1800" dirty="0">
+                <a:latin typeface="Calibri" panose="020F0502020204030204" pitchFamily="34" charset="0"/>
+                <a:ea typeface="Calibri" panose="020F0502020204030204" pitchFamily="34" charset="0"/>
+                <a:cs typeface="Times New Roman" panose="02020603050405020304" pitchFamily="18" charset="0"/>
+              </a:rPr>
+              <a:t>Hamza</a:t>
+            </a:r>
+            <a:r>
+              <a:rPr lang="en-GB" sz="1800" dirty="0">
                 <a:effectLst/>
                 <a:latin typeface="Calibri" panose="020F0502020204030204" pitchFamily="34" charset="0"/>
                 <a:ea typeface="Calibri" panose="020F0502020204030204" pitchFamily="34" charset="0"/>
                 <a:cs typeface="Times New Roman" panose="02020603050405020304" pitchFamily="18" charset="0"/>
               </a:rPr>
-              <a:t>Store owners– have an interest in selling more of their goods and having to throw </a:t>
-            </a:r>
-            <a:r>
-              <a:rPr lang="en-GB" sz="1800" dirty="0" err="1">
+              <a:t> is a poor British Muslim who’s lived in Govan all his life. He has consistent shelter and knows his way around the around but is poorly educated and struggles to get and hold a job. He relies on the food banks and stamps. He currently lives with his parents and his two siblings and so food is always fairly stretched. He would like to get a decent job and move out.</a:t>
+            </a:r>
+          </a:p>
+          <a:p>
+            <a:pPr marL="0" indent="0">
+              <a:lnSpc>
+                <a:spcPct val="107000"/>
+              </a:lnSpc>
+              <a:spcAft>
+                <a:spcPts val="800"/>
+              </a:spcAft>
+              <a:buNone/>
+            </a:pPr>
+            <a:r>
+              <a:rPr lang="en-GB" sz="1800" dirty="0">
                 <a:effectLst/>
                 <a:latin typeface="Calibri" panose="020F0502020204030204" pitchFamily="34" charset="0"/>
                 <a:ea typeface="Calibri" panose="020F0502020204030204" pitchFamily="34" charset="0"/>
                 <a:cs typeface="Times New Roman" panose="02020603050405020304" pitchFamily="18" charset="0"/>
               </a:rPr>
-              <a:t>awayless</a:t>
-            </a:r>
-            <a:endParaRPr lang="en-GB" sz="1800" dirty="0">
-              <a:effectLst/>
-              <a:latin typeface="Calibri" panose="020F0502020204030204" pitchFamily="34" charset="0"/>
-              <a:ea typeface="Calibri" panose="020F0502020204030204" pitchFamily="34" charset="0"/>
-              <a:cs typeface="Times New Roman" panose="02020603050405020304" pitchFamily="18" charset="0"/>
-            </a:endParaRPr>
+              <a:t>Goals</a:t>
+            </a:r>
           </a:p>
           <a:p>
             <a:pPr>
@@ -4453,7 +4466,7 @@
                 <a:ea typeface="Calibri" panose="020F0502020204030204" pitchFamily="34" charset="0"/>
                 <a:cs typeface="Times New Roman" panose="02020603050405020304" pitchFamily="18" charset="0"/>
               </a:rPr>
-              <a:t>Local government – interest in improving the local situation to make it more attractive for new companies/ people to move there</a:t>
+              <a:t>Not to eat Halal</a:t>
             </a:r>
           </a:p>
           <a:p>
@@ -4472,7 +4485,7 @@
                 <a:ea typeface="Calibri" panose="020F0502020204030204" pitchFamily="34" charset="0"/>
                 <a:cs typeface="Times New Roman" panose="02020603050405020304" pitchFamily="18" charset="0"/>
               </a:rPr>
-              <a:t>Local People – have an interest in getting affordable food plus foods that fit in their culture and needs.</a:t>
+              <a:t>Get a decent job and hold it</a:t>
             </a:r>
           </a:p>
           <a:p>
@@ -4491,13 +4504,10 @@
                 <a:ea typeface="Calibri" panose="020F0502020204030204" pitchFamily="34" charset="0"/>
                 <a:cs typeface="Times New Roman" panose="02020603050405020304" pitchFamily="18" charset="0"/>
               </a:rPr>
-              <a:t>Food bank – help reach as many people as possible and have the best possible impact</a:t>
-            </a:r>
-          </a:p>
-          <a:p>
-            <a:pPr marL="0" indent="0">
-              <a:buNone/>
-            </a:pPr>
+              <a:t>Move out of his parents house</a:t>
+            </a:r>
+          </a:p>
+          <a:p>
             <a:endParaRPr lang="en-GB" dirty="0"/>
           </a:p>
         </p:txBody>
@@ -4505,7 +4515,7 @@
     </p:spTree>
     <p:extLst>
       <p:ext uri="{BB962C8B-B14F-4D97-AF65-F5344CB8AC3E}">
-        <p14:creationId xmlns:p14="http://schemas.microsoft.com/office/powerpoint/2010/main" val="1837072753"/>
+        <p14:creationId xmlns:p14="http://schemas.microsoft.com/office/powerpoint/2010/main" val="3017998914"/>
       </p:ext>
     </p:extLst>
   </p:cSld>
@@ -4537,7 +4547,7 @@
           <p:cNvPr id="2" name="Title 1">
             <a:extLst>
               <a:ext uri="{FF2B5EF4-FFF2-40B4-BE49-F238E27FC236}">
-                <a16:creationId xmlns:a16="http://schemas.microsoft.com/office/drawing/2014/main" id="{C5A49108-0DAE-5A4B-BB72-19A74121B778}"/>
+                <a16:creationId xmlns:a16="http://schemas.microsoft.com/office/drawing/2014/main" id="{CE84747D-D69F-347A-3C06-2AECD6B75E90}"/>
               </a:ext>
             </a:extLst>
           </p:cNvPr>
@@ -4555,50 +4565,134 @@
           <a:p>
             <a:r>
               <a:rPr lang="en-GB" dirty="0"/>
-              <a:t>Class diagram</a:t>
-            </a:r>
-          </a:p>
-        </p:txBody>
-      </p:sp>
-      <p:pic>
-        <p:nvPicPr>
-          <p:cNvPr id="5" name="Content Placeholder 4" descr="A picture containing text, screenshot, black&#10;&#10;Description automatically generated">
-            <a:extLst>
-              <a:ext uri="{FF2B5EF4-FFF2-40B4-BE49-F238E27FC236}">
-                <a16:creationId xmlns:a16="http://schemas.microsoft.com/office/drawing/2014/main" id="{BC0F3775-D96B-D8DF-7E6A-04BD2D730AE0}"/>
-              </a:ext>
-            </a:extLst>
-          </p:cNvPr>
-          <p:cNvPicPr>
-            <a:picLocks noGrp="1" noChangeAspect="1"/>
-          </p:cNvPicPr>
+              <a:t>Stakeholders</a:t>
+            </a:r>
+          </a:p>
+        </p:txBody>
+      </p:sp>
+      <p:sp>
+        <p:nvSpPr>
+          <p:cNvPr id="3" name="Content Placeholder 2">
+            <a:extLst>
+              <a:ext uri="{FF2B5EF4-FFF2-40B4-BE49-F238E27FC236}">
+                <a16:creationId xmlns:a16="http://schemas.microsoft.com/office/drawing/2014/main" id="{21B6909D-4262-77DF-A076-BB8FE06EB79E}"/>
+              </a:ext>
+            </a:extLst>
+          </p:cNvPr>
+          <p:cNvSpPr>
+            <a:spLocks noGrp="1"/>
+          </p:cNvSpPr>
           <p:nvPr>
             <p:ph idx="1"/>
           </p:nvPr>
-        </p:nvPicPr>
-        <p:blipFill>
-          <a:blip r:embed="rId2">
-            <a:extLst>
-              <a:ext uri="{28A0092B-C50C-407E-A947-70E740481C1C}">
-                <a14:useLocalDpi xmlns:a14="http://schemas.microsoft.com/office/drawing/2010/main" val="0"/>
-              </a:ext>
-            </a:extLst>
-          </a:blip>
-          <a:stretch>
-            <a:fillRect/>
-          </a:stretch>
-        </p:blipFill>
-        <p:spPr>
-          <a:xfrm>
-            <a:off x="555612" y="2673441"/>
-            <a:ext cx="10201275" cy="2095500"/>
-          </a:xfrm>
-        </p:spPr>
-      </p:pic>
+        </p:nvSpPr>
+        <p:spPr/>
+        <p:txBody>
+          <a:bodyPr/>
+          <a:lstStyle/>
+          <a:p>
+            <a:pPr>
+              <a:lnSpc>
+                <a:spcPct val="107000"/>
+              </a:lnSpc>
+              <a:spcAft>
+                <a:spcPts val="800"/>
+              </a:spcAft>
+            </a:pPr>
+            <a:r>
+              <a:rPr lang="en-GB" sz="1800" dirty="0">
+                <a:effectLst/>
+                <a:latin typeface="Calibri" panose="020F0502020204030204" pitchFamily="34" charset="0"/>
+                <a:ea typeface="Calibri" panose="020F0502020204030204" pitchFamily="34" charset="0"/>
+                <a:cs typeface="Times New Roman" panose="02020603050405020304" pitchFamily="18" charset="0"/>
+              </a:rPr>
+              <a:t>Store owners– have an interest in selling more of their goods and having to throw </a:t>
+            </a:r>
+            <a:r>
+              <a:rPr lang="en-GB" sz="1800" dirty="0" err="1">
+                <a:effectLst/>
+                <a:latin typeface="Calibri" panose="020F0502020204030204" pitchFamily="34" charset="0"/>
+                <a:ea typeface="Calibri" panose="020F0502020204030204" pitchFamily="34" charset="0"/>
+                <a:cs typeface="Times New Roman" panose="02020603050405020304" pitchFamily="18" charset="0"/>
+              </a:rPr>
+              <a:t>awayless</a:t>
+            </a:r>
+            <a:endParaRPr lang="en-GB" sz="1800" dirty="0">
+              <a:effectLst/>
+              <a:latin typeface="Calibri" panose="020F0502020204030204" pitchFamily="34" charset="0"/>
+              <a:ea typeface="Calibri" panose="020F0502020204030204" pitchFamily="34" charset="0"/>
+              <a:cs typeface="Times New Roman" panose="02020603050405020304" pitchFamily="18" charset="0"/>
+            </a:endParaRPr>
+          </a:p>
+          <a:p>
+            <a:pPr>
+              <a:lnSpc>
+                <a:spcPct val="107000"/>
+              </a:lnSpc>
+              <a:spcAft>
+                <a:spcPts val="800"/>
+              </a:spcAft>
+            </a:pPr>
+            <a:r>
+              <a:rPr lang="en-GB" sz="1800" dirty="0">
+                <a:effectLst/>
+                <a:latin typeface="Calibri" panose="020F0502020204030204" pitchFamily="34" charset="0"/>
+                <a:ea typeface="Calibri" panose="020F0502020204030204" pitchFamily="34" charset="0"/>
+                <a:cs typeface="Times New Roman" panose="02020603050405020304" pitchFamily="18" charset="0"/>
+              </a:rPr>
+              <a:t>Local government – interest in improving the local situation to make it more attractive for new companies/ people to move there</a:t>
+            </a:r>
+          </a:p>
+          <a:p>
+            <a:pPr>
+              <a:lnSpc>
+                <a:spcPct val="107000"/>
+              </a:lnSpc>
+              <a:spcAft>
+                <a:spcPts val="800"/>
+              </a:spcAft>
+            </a:pPr>
+            <a:r>
+              <a:rPr lang="en-GB" sz="1800" dirty="0">
+                <a:effectLst/>
+                <a:latin typeface="Calibri" panose="020F0502020204030204" pitchFamily="34" charset="0"/>
+                <a:ea typeface="Calibri" panose="020F0502020204030204" pitchFamily="34" charset="0"/>
+                <a:cs typeface="Times New Roman" panose="02020603050405020304" pitchFamily="18" charset="0"/>
+              </a:rPr>
+              <a:t>Local People – have an interest in getting affordable food plus foods that fit in their culture and needs.</a:t>
+            </a:r>
+          </a:p>
+          <a:p>
+            <a:pPr>
+              <a:lnSpc>
+                <a:spcPct val="107000"/>
+              </a:lnSpc>
+              <a:spcAft>
+                <a:spcPts val="800"/>
+              </a:spcAft>
+            </a:pPr>
+            <a:r>
+              <a:rPr lang="en-GB" sz="1800" dirty="0">
+                <a:effectLst/>
+                <a:latin typeface="Calibri" panose="020F0502020204030204" pitchFamily="34" charset="0"/>
+                <a:ea typeface="Calibri" panose="020F0502020204030204" pitchFamily="34" charset="0"/>
+                <a:cs typeface="Times New Roman" panose="02020603050405020304" pitchFamily="18" charset="0"/>
+              </a:rPr>
+              <a:t>Food bank – help reach as many people as possible and have the best possible impact</a:t>
+            </a:r>
+          </a:p>
+          <a:p>
+            <a:pPr marL="0" indent="0">
+              <a:buNone/>
+            </a:pPr>
+            <a:endParaRPr lang="en-GB" dirty="0"/>
+          </a:p>
+        </p:txBody>
+      </p:sp>
     </p:spTree>
     <p:extLst>
       <p:ext uri="{BB962C8B-B14F-4D97-AF65-F5344CB8AC3E}">
-        <p14:creationId xmlns:p14="http://schemas.microsoft.com/office/powerpoint/2010/main" val="2179144815"/>
+        <p14:creationId xmlns:p14="http://schemas.microsoft.com/office/powerpoint/2010/main" val="1837072753"/>
       </p:ext>
     </p:extLst>
   </p:cSld>
@@ -4630,7 +4724,7 @@
           <p:cNvPr id="2" name="Title 1">
             <a:extLst>
               <a:ext uri="{FF2B5EF4-FFF2-40B4-BE49-F238E27FC236}">
-                <a16:creationId xmlns:a16="http://schemas.microsoft.com/office/drawing/2014/main" id="{9CD91D97-1A29-C375-BE76-83DE0B3EEAEF}"/>
+                <a16:creationId xmlns:a16="http://schemas.microsoft.com/office/drawing/2014/main" id="{C5A49108-0DAE-5A4B-BB72-19A74121B778}"/>
               </a:ext>
             </a:extLst>
           </p:cNvPr>
@@ -4648,17 +4742,17 @@
           <a:p>
             <a:r>
               <a:rPr lang="en-GB" dirty="0"/>
-              <a:t>Use Case Diagram</a:t>
+              <a:t>Class diagram</a:t>
             </a:r>
           </a:p>
         </p:txBody>
       </p:sp>
       <p:pic>
         <p:nvPicPr>
-          <p:cNvPr id="5" name="Content Placeholder 4" descr="A diagram of a product&#10;&#10;Description automatically generated with low confidence">
-            <a:extLst>
-              <a:ext uri="{FF2B5EF4-FFF2-40B4-BE49-F238E27FC236}">
-                <a16:creationId xmlns:a16="http://schemas.microsoft.com/office/drawing/2014/main" id="{744E3040-6087-9B57-CC90-1C9A74B2C9A5}"/>
+          <p:cNvPr id="5" name="Content Placeholder 4" descr="A picture containing text, screenshot, black&#10;&#10;Description automatically generated">
+            <a:extLst>
+              <a:ext uri="{FF2B5EF4-FFF2-40B4-BE49-F238E27FC236}">
+                <a16:creationId xmlns:a16="http://schemas.microsoft.com/office/drawing/2014/main" id="{BC0F3775-D96B-D8DF-7E6A-04BD2D730AE0}"/>
               </a:ext>
             </a:extLst>
           </p:cNvPr>
@@ -4683,15 +4777,15 @@
         </p:blipFill>
         <p:spPr>
           <a:xfrm>
-            <a:off x="2909054" y="1825625"/>
-            <a:ext cx="6373891" cy="4351338"/>
+            <a:off x="555612" y="2673441"/>
+            <a:ext cx="10201275" cy="2095500"/>
           </a:xfrm>
         </p:spPr>
       </p:pic>
     </p:spTree>
     <p:extLst>
       <p:ext uri="{BB962C8B-B14F-4D97-AF65-F5344CB8AC3E}">
-        <p14:creationId xmlns:p14="http://schemas.microsoft.com/office/powerpoint/2010/main" val="1069822731"/>
+        <p14:creationId xmlns:p14="http://schemas.microsoft.com/office/powerpoint/2010/main" val="2179144815"/>
       </p:ext>
     </p:extLst>
   </p:cSld>

</xml_diff>

<commit_message>
UML of database design + user testing
</commit_message>
<xml_diff>
--- a/Files/Synoptic project 2023.pptx
+++ b/Files/Synoptic project 2023.pptx
@@ -15,9 +15,10 @@
     <p:sldId id="267" r:id="rId9"/>
     <p:sldId id="260" r:id="rId10"/>
     <p:sldId id="268" r:id="rId11"/>
-    <p:sldId id="265" r:id="rId12"/>
-    <p:sldId id="264" r:id="rId13"/>
+    <p:sldId id="264" r:id="rId12"/>
+    <p:sldId id="269" r:id="rId13"/>
     <p:sldId id="263" r:id="rId14"/>
+    <p:sldId id="270" r:id="rId15"/>
   </p:sldIdLst>
   <p:sldSz cx="12192000" cy="6858000"/>
   <p:notesSz cx="6858000" cy="9144000"/>
@@ -3542,7 +3543,7 @@
           <p:cNvPr id="2" name="Title 1">
             <a:extLst>
               <a:ext uri="{FF2B5EF4-FFF2-40B4-BE49-F238E27FC236}">
-                <a16:creationId xmlns:a16="http://schemas.microsoft.com/office/drawing/2014/main" id="{C5A49108-0DAE-5A4B-BB72-19A74121B778}"/>
+                <a16:creationId xmlns:a16="http://schemas.microsoft.com/office/drawing/2014/main" id="{9CD91D97-1A29-C375-BE76-83DE0B3EEAEF}"/>
               </a:ext>
             </a:extLst>
           </p:cNvPr>
@@ -3560,17 +3561,17 @@
           <a:p>
             <a:r>
               <a:rPr lang="en-GB" dirty="0"/>
-              <a:t>Class diagram</a:t>
+              <a:t>Use Case Diagram</a:t>
             </a:r>
           </a:p>
         </p:txBody>
       </p:sp>
       <p:pic>
         <p:nvPicPr>
-          <p:cNvPr id="5" name="Content Placeholder 4" descr="A picture containing text, screenshot, black&#10;&#10;Description automatically generated">
-            <a:extLst>
-              <a:ext uri="{FF2B5EF4-FFF2-40B4-BE49-F238E27FC236}">
-                <a16:creationId xmlns:a16="http://schemas.microsoft.com/office/drawing/2014/main" id="{BC0F3775-D96B-D8DF-7E6A-04BD2D730AE0}"/>
+          <p:cNvPr id="5" name="Content Placeholder 4" descr="A diagram of a product&#10;&#10;Description automatically generated with low confidence">
+            <a:extLst>
+              <a:ext uri="{FF2B5EF4-FFF2-40B4-BE49-F238E27FC236}">
+                <a16:creationId xmlns:a16="http://schemas.microsoft.com/office/drawing/2014/main" id="{744E3040-6087-9B57-CC90-1C9A74B2C9A5}"/>
               </a:ext>
             </a:extLst>
           </p:cNvPr>
@@ -3595,50 +3596,15 @@
         </p:blipFill>
         <p:spPr>
           <a:xfrm>
-            <a:off x="555612" y="2673441"/>
-            <a:ext cx="10201275" cy="2095500"/>
+            <a:off x="2909054" y="1825625"/>
+            <a:ext cx="6373891" cy="4351338"/>
           </a:xfrm>
         </p:spPr>
       </p:pic>
-      <p:sp>
-        <p:nvSpPr>
-          <p:cNvPr id="3" name="TextBox 2">
-            <a:extLst>
-              <a:ext uri="{FF2B5EF4-FFF2-40B4-BE49-F238E27FC236}">
-                <a16:creationId xmlns:a16="http://schemas.microsoft.com/office/drawing/2014/main" id="{CF595EE7-3325-7755-470D-CCAEBD377F38}"/>
-              </a:ext>
-            </a:extLst>
-          </p:cNvPr>
-          <p:cNvSpPr txBox="1"/>
-          <p:nvPr/>
-        </p:nvSpPr>
-        <p:spPr>
-          <a:xfrm>
-            <a:off x="5246674" y="3459581"/>
-            <a:ext cx="456896" cy="261610"/>
-          </a:xfrm>
-          <a:prstGeom prst="rect">
-            <a:avLst/>
-          </a:prstGeom>
-          <a:noFill/>
-        </p:spPr>
-        <p:txBody>
-          <a:bodyPr wrap="square" rtlCol="0">
-            <a:spAutoFit/>
-          </a:bodyPr>
-          <a:lstStyle/>
-          <a:p>
-            <a:r>
-              <a:rPr lang="en-GB" sz="1100" dirty="0"/>
-              <a:t>*…*</a:t>
-            </a:r>
-          </a:p>
-        </p:txBody>
-      </p:sp>
     </p:spTree>
     <p:extLst>
       <p:ext uri="{BB962C8B-B14F-4D97-AF65-F5344CB8AC3E}">
-        <p14:creationId xmlns:p14="http://schemas.microsoft.com/office/powerpoint/2010/main" val="2179144815"/>
+        <p14:creationId xmlns:p14="http://schemas.microsoft.com/office/powerpoint/2010/main" val="1069822731"/>
       </p:ext>
     </p:extLst>
   </p:cSld>
@@ -3670,7 +3636,7 @@
           <p:cNvPr id="2" name="Title 1">
             <a:extLst>
               <a:ext uri="{FF2B5EF4-FFF2-40B4-BE49-F238E27FC236}">
-                <a16:creationId xmlns:a16="http://schemas.microsoft.com/office/drawing/2014/main" id="{9CD91D97-1A29-C375-BE76-83DE0B3EEAEF}"/>
+                <a16:creationId xmlns:a16="http://schemas.microsoft.com/office/drawing/2014/main" id="{420E29C8-06D6-0567-8AA8-D94EA315407E}"/>
               </a:ext>
             </a:extLst>
           </p:cNvPr>
@@ -3688,17 +3654,17 @@
           <a:p>
             <a:r>
               <a:rPr lang="en-GB" dirty="0"/>
-              <a:t>Use Case Diagram</a:t>
+              <a:t>UML of database systems</a:t>
             </a:r>
           </a:p>
         </p:txBody>
       </p:sp>
       <p:pic>
         <p:nvPicPr>
-          <p:cNvPr id="5" name="Content Placeholder 4" descr="A diagram of a product&#10;&#10;Description automatically generated with low confidence">
-            <a:extLst>
-              <a:ext uri="{FF2B5EF4-FFF2-40B4-BE49-F238E27FC236}">
-                <a16:creationId xmlns:a16="http://schemas.microsoft.com/office/drawing/2014/main" id="{744E3040-6087-9B57-CC90-1C9A74B2C9A5}"/>
+          <p:cNvPr id="5" name="Content Placeholder 4" descr="A screenshot of a computer&#10;&#10;Description automatically generated with medium confidence">
+            <a:extLst>
+              <a:ext uri="{FF2B5EF4-FFF2-40B4-BE49-F238E27FC236}">
+                <a16:creationId xmlns:a16="http://schemas.microsoft.com/office/drawing/2014/main" id="{61D878FC-A8C3-1B07-C1E8-2A0927AE32D9}"/>
               </a:ext>
             </a:extLst>
           </p:cNvPr>
@@ -3723,15 +3689,15 @@
         </p:blipFill>
         <p:spPr>
           <a:xfrm>
-            <a:off x="2909054" y="1825625"/>
-            <a:ext cx="6373891" cy="4351338"/>
+            <a:off x="918502" y="2060020"/>
+            <a:ext cx="9808813" cy="3106339"/>
           </a:xfrm>
         </p:spPr>
       </p:pic>
     </p:spTree>
     <p:extLst>
       <p:ext uri="{BB962C8B-B14F-4D97-AF65-F5344CB8AC3E}">
-        <p14:creationId xmlns:p14="http://schemas.microsoft.com/office/powerpoint/2010/main" val="1069822731"/>
+        <p14:creationId xmlns:p14="http://schemas.microsoft.com/office/powerpoint/2010/main" val="2913478297"/>
       </p:ext>
     </p:extLst>
   </p:cSld>
@@ -3860,6 +3826,116 @@
     <p:extLst>
       <p:ext uri="{BB962C8B-B14F-4D97-AF65-F5344CB8AC3E}">
         <p14:creationId xmlns:p14="http://schemas.microsoft.com/office/powerpoint/2010/main" val="3771815473"/>
+      </p:ext>
+    </p:extLst>
+  </p:cSld>
+  <p:clrMapOvr>
+    <a:masterClrMapping/>
+  </p:clrMapOvr>
+</p:sld>
+</file>
+
+<file path=ppt/slides/slide14.xml><?xml version="1.0" encoding="utf-8"?>
+<p:sld xmlns:a="http://schemas.openxmlformats.org/drawingml/2006/main" xmlns:r="http://schemas.openxmlformats.org/officeDocument/2006/relationships" xmlns:p="http://schemas.openxmlformats.org/presentationml/2006/main">
+  <p:cSld>
+    <p:spTree>
+      <p:nvGrpSpPr>
+        <p:cNvPr id="1" name=""/>
+        <p:cNvGrpSpPr/>
+        <p:nvPr/>
+      </p:nvGrpSpPr>
+      <p:grpSpPr>
+        <a:xfrm>
+          <a:off x="0" y="0"/>
+          <a:ext cx="0" cy="0"/>
+          <a:chOff x="0" y="0"/>
+          <a:chExt cx="0" cy="0"/>
+        </a:xfrm>
+      </p:grpSpPr>
+      <p:sp>
+        <p:nvSpPr>
+          <p:cNvPr id="2" name="Title 1">
+            <a:extLst>
+              <a:ext uri="{FF2B5EF4-FFF2-40B4-BE49-F238E27FC236}">
+                <a16:creationId xmlns:a16="http://schemas.microsoft.com/office/drawing/2014/main" id="{F11C757A-5661-356C-1C4F-F395DD615227}"/>
+              </a:ext>
+            </a:extLst>
+          </p:cNvPr>
+          <p:cNvSpPr>
+            <a:spLocks noGrp="1"/>
+          </p:cNvSpPr>
+          <p:nvPr>
+            <p:ph type="title"/>
+          </p:nvPr>
+        </p:nvSpPr>
+        <p:spPr/>
+        <p:txBody>
+          <a:bodyPr/>
+          <a:lstStyle/>
+          <a:p>
+            <a:r>
+              <a:rPr lang="en-GB" dirty="0"/>
+              <a:t>User testing</a:t>
+            </a:r>
+          </a:p>
+        </p:txBody>
+      </p:sp>
+      <p:sp>
+        <p:nvSpPr>
+          <p:cNvPr id="3" name="Content Placeholder 2">
+            <a:extLst>
+              <a:ext uri="{FF2B5EF4-FFF2-40B4-BE49-F238E27FC236}">
+                <a16:creationId xmlns:a16="http://schemas.microsoft.com/office/drawing/2014/main" id="{234BC68F-FC5D-A1D8-81D7-8FF6165A52D9}"/>
+              </a:ext>
+            </a:extLst>
+          </p:cNvPr>
+          <p:cNvSpPr>
+            <a:spLocks noGrp="1"/>
+          </p:cNvSpPr>
+          <p:nvPr>
+            <p:ph idx="1"/>
+          </p:nvPr>
+        </p:nvSpPr>
+        <p:spPr/>
+        <p:txBody>
+          <a:bodyPr/>
+          <a:lstStyle/>
+          <a:p>
+            <a:r>
+              <a:rPr lang="en-GB" dirty="0"/>
+              <a:t>2 people tried it</a:t>
+            </a:r>
+          </a:p>
+          <a:p>
+            <a:r>
+              <a:rPr lang="en-GB" dirty="0"/>
+              <a:t>“it doesn’t really link together – all the pages are individual and not connected”</a:t>
+            </a:r>
+          </a:p>
+          <a:p>
+            <a:r>
+              <a:rPr lang="en-GB" dirty="0"/>
+              <a:t>“The filter on the maps page was confusing and worked oddly”</a:t>
+            </a:r>
+          </a:p>
+          <a:p>
+            <a:r>
+              <a:rPr lang="en-GB" dirty="0"/>
+              <a:t>“Why are there question marks in the filter tab”</a:t>
+            </a:r>
+          </a:p>
+          <a:p>
+            <a:r>
+              <a:rPr lang="en-GB" dirty="0"/>
+              <a:t>“Something feels weird about the presentation in phone mode”</a:t>
+            </a:r>
+          </a:p>
+        </p:txBody>
+      </p:sp>
+    </p:spTree>
+    <p:extLst>
+      <p:ext uri="{BB962C8B-B14F-4D97-AF65-F5344CB8AC3E}">
+        <p14:creationId xmlns:p14="http://schemas.microsoft.com/office/powerpoint/2010/main" val="1850773485"/>
       </p:ext>
     </p:extLst>
   </p:cSld>

</xml_diff>

<commit_message>
added some ideas for future development
</commit_message>
<xml_diff>
--- a/Files/Synoptic project 2023.pptx
+++ b/Files/Synoptic project 2023.pptx
@@ -19,6 +19,7 @@
     <p:sldId id="269" r:id="rId13"/>
     <p:sldId id="263" r:id="rId14"/>
     <p:sldId id="270" r:id="rId15"/>
+    <p:sldId id="271" r:id="rId16"/>
   </p:sldIdLst>
   <p:sldSz cx="12192000" cy="6858000"/>
   <p:notesSz cx="6858000" cy="9144000"/>
@@ -3950,6 +3951,111 @@
 </p:sld>
 </file>
 
+<file path=ppt/slides/slide15.xml><?xml version="1.0" encoding="utf-8"?>
+<p:sld xmlns:a="http://schemas.openxmlformats.org/drawingml/2006/main" xmlns:r="http://schemas.openxmlformats.org/officeDocument/2006/relationships" xmlns:p="http://schemas.openxmlformats.org/presentationml/2006/main">
+  <p:cSld>
+    <p:spTree>
+      <p:nvGrpSpPr>
+        <p:cNvPr id="1" name=""/>
+        <p:cNvGrpSpPr/>
+        <p:nvPr/>
+      </p:nvGrpSpPr>
+      <p:grpSpPr>
+        <a:xfrm>
+          <a:off x="0" y="0"/>
+          <a:ext cx="0" cy="0"/>
+          <a:chOff x="0" y="0"/>
+          <a:chExt cx="0" cy="0"/>
+        </a:xfrm>
+      </p:grpSpPr>
+      <p:sp>
+        <p:nvSpPr>
+          <p:cNvPr id="2" name="Title 1">
+            <a:extLst>
+              <a:ext uri="{FF2B5EF4-FFF2-40B4-BE49-F238E27FC236}">
+                <a16:creationId xmlns:a16="http://schemas.microsoft.com/office/drawing/2014/main" id="{1BF52F72-CFE0-D903-91C8-050FE347AB08}"/>
+              </a:ext>
+            </a:extLst>
+          </p:cNvPr>
+          <p:cNvSpPr>
+            <a:spLocks noGrp="1"/>
+          </p:cNvSpPr>
+          <p:nvPr>
+            <p:ph type="title"/>
+          </p:nvPr>
+        </p:nvSpPr>
+        <p:spPr/>
+        <p:txBody>
+          <a:bodyPr/>
+          <a:lstStyle/>
+          <a:p>
+            <a:r>
+              <a:rPr lang="en-GB"/>
+              <a:t>Future development</a:t>
+            </a:r>
+            <a:endParaRPr lang="en-GB" dirty="0"/>
+          </a:p>
+        </p:txBody>
+      </p:sp>
+      <p:sp>
+        <p:nvSpPr>
+          <p:cNvPr id="3" name="Content Placeholder 2">
+            <a:extLst>
+              <a:ext uri="{FF2B5EF4-FFF2-40B4-BE49-F238E27FC236}">
+                <a16:creationId xmlns:a16="http://schemas.microsoft.com/office/drawing/2014/main" id="{3F180D6F-0886-07FC-063A-CC519687FDC6}"/>
+              </a:ext>
+            </a:extLst>
+          </p:cNvPr>
+          <p:cNvSpPr>
+            <a:spLocks noGrp="1"/>
+          </p:cNvSpPr>
+          <p:nvPr>
+            <p:ph idx="1"/>
+          </p:nvPr>
+        </p:nvSpPr>
+        <p:spPr/>
+        <p:txBody>
+          <a:bodyPr/>
+          <a:lstStyle/>
+          <a:p>
+            <a:r>
+              <a:rPr lang="en-GB" dirty="0"/>
+              <a:t>Not complete</a:t>
+            </a:r>
+          </a:p>
+          <a:p>
+            <a:r>
+              <a:rPr lang="en-GB" dirty="0"/>
+              <a:t>Reduce necessity of internet access</a:t>
+            </a:r>
+          </a:p>
+          <a:p>
+            <a:r>
+              <a:rPr lang="en-GB" dirty="0"/>
+              <a:t>Improve phone compatibility</a:t>
+            </a:r>
+          </a:p>
+          <a:p>
+            <a:r>
+              <a:rPr lang="en-GB" dirty="0"/>
+              <a:t>Give options to add new items to shops</a:t>
+            </a:r>
+          </a:p>
+        </p:txBody>
+      </p:sp>
+    </p:spTree>
+    <p:extLst>
+      <p:ext uri="{BB962C8B-B14F-4D97-AF65-F5344CB8AC3E}">
+        <p14:creationId xmlns:p14="http://schemas.microsoft.com/office/powerpoint/2010/main" val="2670054515"/>
+      </p:ext>
+    </p:extLst>
+  </p:cSld>
+  <p:clrMapOvr>
+    <a:masterClrMapping/>
+  </p:clrMapOvr>
+</p:sld>
+</file>
+
 <file path=ppt/slides/slide2.xml><?xml version="1.0" encoding="utf-8"?>
 <p:sld xmlns:a="http://schemas.openxmlformats.org/drawingml/2006/main" xmlns:r="http://schemas.openxmlformats.org/officeDocument/2006/relationships" xmlns:p="http://schemas.openxmlformats.org/presentationml/2006/main">
   <p:cSld>

</xml_diff>